<commit_message>
IEEE P7001 Transparency Standard Requirements for Cloakroom Draft - 04 Oct 2022
</commit_message>
<xml_diff>
--- a/source/figures/Stage1-2_Figs.pptx
+++ b/source/figures/Stage1-2_Figs.pptx
@@ -9,6 +9,7 @@
     <p:sldId id="257" r:id="rId3"/>
     <p:sldId id="258" r:id="rId4"/>
     <p:sldId id="259" r:id="rId5"/>
+    <p:sldId id="260" r:id="rId6"/>
   </p:sldIdLst>
   <p:sldSz cx="12192000" cy="6858000"/>
   <p:notesSz cx="6858000" cy="9144000"/>
@@ -262,7 +263,7 @@
           <a:p>
             <a:fld id="{EAB2B32C-6456-694A-B1E0-FE9645974ECB}" type="datetimeFigureOut">
               <a:rPr lang="en-GB" smtClean="0"/>
-              <a:t>16/09/2022</a:t>
+              <a:t>04/10/2022</a:t>
             </a:fld>
             <a:endParaRPr lang="en-GB"/>
           </a:p>
@@ -460,7 +461,7 @@
           <a:p>
             <a:fld id="{EAB2B32C-6456-694A-B1E0-FE9645974ECB}" type="datetimeFigureOut">
               <a:rPr lang="en-GB" smtClean="0"/>
-              <a:t>16/09/2022</a:t>
+              <a:t>04/10/2022</a:t>
             </a:fld>
             <a:endParaRPr lang="en-GB"/>
           </a:p>
@@ -668,7 +669,7 @@
           <a:p>
             <a:fld id="{EAB2B32C-6456-694A-B1E0-FE9645974ECB}" type="datetimeFigureOut">
               <a:rPr lang="en-GB" smtClean="0"/>
-              <a:t>16/09/2022</a:t>
+              <a:t>04/10/2022</a:t>
             </a:fld>
             <a:endParaRPr lang="en-GB"/>
           </a:p>
@@ -866,7 +867,7 @@
           <a:p>
             <a:fld id="{EAB2B32C-6456-694A-B1E0-FE9645974ECB}" type="datetimeFigureOut">
               <a:rPr lang="en-GB" smtClean="0"/>
-              <a:t>16/09/2022</a:t>
+              <a:t>04/10/2022</a:t>
             </a:fld>
             <a:endParaRPr lang="en-GB"/>
           </a:p>
@@ -1141,7 +1142,7 @@
           <a:p>
             <a:fld id="{EAB2B32C-6456-694A-B1E0-FE9645974ECB}" type="datetimeFigureOut">
               <a:rPr lang="en-GB" smtClean="0"/>
-              <a:t>16/09/2022</a:t>
+              <a:t>04/10/2022</a:t>
             </a:fld>
             <a:endParaRPr lang="en-GB"/>
           </a:p>
@@ -1406,7 +1407,7 @@
           <a:p>
             <a:fld id="{EAB2B32C-6456-694A-B1E0-FE9645974ECB}" type="datetimeFigureOut">
               <a:rPr lang="en-GB" smtClean="0"/>
-              <a:t>16/09/2022</a:t>
+              <a:t>04/10/2022</a:t>
             </a:fld>
             <a:endParaRPr lang="en-GB"/>
           </a:p>
@@ -1818,7 +1819,7 @@
           <a:p>
             <a:fld id="{EAB2B32C-6456-694A-B1E0-FE9645974ECB}" type="datetimeFigureOut">
               <a:rPr lang="en-GB" smtClean="0"/>
-              <a:t>16/09/2022</a:t>
+              <a:t>04/10/2022</a:t>
             </a:fld>
             <a:endParaRPr lang="en-GB"/>
           </a:p>
@@ -1959,7 +1960,7 @@
           <a:p>
             <a:fld id="{EAB2B32C-6456-694A-B1E0-FE9645974ECB}" type="datetimeFigureOut">
               <a:rPr lang="en-GB" smtClean="0"/>
-              <a:t>16/09/2022</a:t>
+              <a:t>04/10/2022</a:t>
             </a:fld>
             <a:endParaRPr lang="en-GB"/>
           </a:p>
@@ -2072,7 +2073,7 @@
           <a:p>
             <a:fld id="{EAB2B32C-6456-694A-B1E0-FE9645974ECB}" type="datetimeFigureOut">
               <a:rPr lang="en-GB" smtClean="0"/>
-              <a:t>16/09/2022</a:t>
+              <a:t>04/10/2022</a:t>
             </a:fld>
             <a:endParaRPr lang="en-GB"/>
           </a:p>
@@ -2383,7 +2384,7 @@
           <a:p>
             <a:fld id="{EAB2B32C-6456-694A-B1E0-FE9645974ECB}" type="datetimeFigureOut">
               <a:rPr lang="en-GB" smtClean="0"/>
-              <a:t>16/09/2022</a:t>
+              <a:t>04/10/2022</a:t>
             </a:fld>
             <a:endParaRPr lang="en-GB"/>
           </a:p>
@@ -2671,7 +2672,7 @@
           <a:p>
             <a:fld id="{EAB2B32C-6456-694A-B1E0-FE9645974ECB}" type="datetimeFigureOut">
               <a:rPr lang="en-GB" smtClean="0"/>
-              <a:t>16/09/2022</a:t>
+              <a:t>04/10/2022</a:t>
             </a:fld>
             <a:endParaRPr lang="en-GB"/>
           </a:p>
@@ -2912,7 +2913,7 @@
           <a:p>
             <a:fld id="{EAB2B32C-6456-694A-B1E0-FE9645974ECB}" type="datetimeFigureOut">
               <a:rPr lang="en-GB" smtClean="0"/>
-              <a:t>16/09/2022</a:t>
+              <a:t>04/10/2022</a:t>
             </a:fld>
             <a:endParaRPr lang="en-GB"/>
           </a:p>
@@ -8800,6 +8801,1273 @@
 </p:sld>
 </file>
 
+<file path=ppt/slides/slide5.xml><?xml version="1.0" encoding="utf-8"?>
+<p:sld xmlns:a="http://schemas.openxmlformats.org/drawingml/2006/main" xmlns:r="http://schemas.openxmlformats.org/officeDocument/2006/relationships" xmlns:p="http://schemas.openxmlformats.org/presentationml/2006/main">
+  <p:cSld>
+    <p:spTree>
+      <p:nvGrpSpPr>
+        <p:cNvPr id="1" name=""/>
+        <p:cNvGrpSpPr/>
+        <p:nvPr/>
+      </p:nvGrpSpPr>
+      <p:grpSpPr>
+        <a:xfrm>
+          <a:off x="0" y="0"/>
+          <a:ext cx="0" cy="0"/>
+          <a:chOff x="0" y="0"/>
+          <a:chExt cx="0" cy="0"/>
+        </a:xfrm>
+      </p:grpSpPr>
+      <p:sp>
+        <p:nvSpPr>
+          <p:cNvPr id="4" name="Rectangle 3">
+            <a:extLst>
+              <a:ext uri="{FF2B5EF4-FFF2-40B4-BE49-F238E27FC236}">
+                <a16:creationId xmlns:a16="http://schemas.microsoft.com/office/drawing/2014/main" id="{CF2DA999-59B6-A473-37AE-5928341CA187}"/>
+              </a:ext>
+            </a:extLst>
+          </p:cNvPr>
+          <p:cNvSpPr/>
+          <p:nvPr/>
+        </p:nvSpPr>
+        <p:spPr>
+          <a:xfrm>
+            <a:off x="2919873" y="3295266"/>
+            <a:ext cx="1550193" cy="735807"/>
+          </a:xfrm>
+          <a:prstGeom prst="rect">
+            <a:avLst/>
+          </a:prstGeom>
+          <a:solidFill>
+            <a:schemeClr val="bg2">
+              <a:lumMod val="90000"/>
+            </a:schemeClr>
+          </a:solidFill>
+          <a:ln w="19050">
+            <a:solidFill>
+              <a:schemeClr val="tx1"/>
+            </a:solidFill>
+          </a:ln>
+        </p:spPr>
+        <p:style>
+          <a:lnRef idx="2">
+            <a:schemeClr val="accent1">
+              <a:shade val="50000"/>
+            </a:schemeClr>
+          </a:lnRef>
+          <a:fillRef idx="1">
+            <a:schemeClr val="accent1"/>
+          </a:fillRef>
+          <a:effectRef idx="0">
+            <a:schemeClr val="accent1"/>
+          </a:effectRef>
+          <a:fontRef idx="minor">
+            <a:schemeClr val="lt1"/>
+          </a:fontRef>
+        </p:style>
+        <p:txBody>
+          <a:bodyPr rot="0" spcFirstLastPara="0" vertOverflow="overflow" horzOverflow="overflow" vert="horz" wrap="square" lIns="68580" tIns="34291" rIns="68580" bIns="34291" numCol="1" spcCol="0" rtlCol="0" fromWordArt="0" anchor="ctr" anchorCtr="0" forceAA="0" compatLnSpc="1">
+            <a:prstTxWarp prst="textNoShape">
+              <a:avLst/>
+            </a:prstTxWarp>
+            <a:noAutofit/>
+          </a:bodyPr>
+          <a:lstStyle/>
+          <a:p>
+            <a:pPr algn="ctr"/>
+            <a:endParaRPr lang="en-GB" sz="1012">
+              <a:solidFill>
+                <a:schemeClr val="tx1"/>
+              </a:solidFill>
+            </a:endParaRPr>
+          </a:p>
+        </p:txBody>
+      </p:sp>
+      <p:sp>
+        <p:nvSpPr>
+          <p:cNvPr id="5" name="Rectangle 4">
+            <a:extLst>
+              <a:ext uri="{FF2B5EF4-FFF2-40B4-BE49-F238E27FC236}">
+                <a16:creationId xmlns:a16="http://schemas.microsoft.com/office/drawing/2014/main" id="{9F8FF995-D685-8564-5A3F-1284CF2E3CC9}"/>
+              </a:ext>
+            </a:extLst>
+          </p:cNvPr>
+          <p:cNvSpPr/>
+          <p:nvPr/>
+        </p:nvSpPr>
+        <p:spPr>
+          <a:xfrm>
+            <a:off x="5136205" y="3290362"/>
+            <a:ext cx="1550193" cy="735807"/>
+          </a:xfrm>
+          <a:prstGeom prst="rect">
+            <a:avLst/>
+          </a:prstGeom>
+          <a:solidFill>
+            <a:schemeClr val="bg2">
+              <a:lumMod val="90000"/>
+            </a:schemeClr>
+          </a:solidFill>
+          <a:ln w="19050">
+            <a:solidFill>
+              <a:schemeClr val="tx1"/>
+            </a:solidFill>
+          </a:ln>
+        </p:spPr>
+        <p:style>
+          <a:lnRef idx="2">
+            <a:schemeClr val="accent1">
+              <a:shade val="50000"/>
+            </a:schemeClr>
+          </a:lnRef>
+          <a:fillRef idx="1">
+            <a:schemeClr val="accent1"/>
+          </a:fillRef>
+          <a:effectRef idx="0">
+            <a:schemeClr val="accent1"/>
+          </a:effectRef>
+          <a:fontRef idx="minor">
+            <a:schemeClr val="lt1"/>
+          </a:fontRef>
+        </p:style>
+        <p:txBody>
+          <a:bodyPr rot="0" spcFirstLastPara="0" vertOverflow="overflow" horzOverflow="overflow" vert="horz" wrap="square" lIns="68580" tIns="34291" rIns="68580" bIns="34291" numCol="1" spcCol="0" rtlCol="0" fromWordArt="0" anchor="ctr" anchorCtr="0" forceAA="0" compatLnSpc="1">
+            <a:prstTxWarp prst="textNoShape">
+              <a:avLst/>
+            </a:prstTxWarp>
+            <a:noAutofit/>
+          </a:bodyPr>
+          <a:lstStyle/>
+          <a:p>
+            <a:pPr algn="ctr"/>
+            <a:endParaRPr lang="en-GB" sz="1012">
+              <a:solidFill>
+                <a:schemeClr val="tx1"/>
+              </a:solidFill>
+            </a:endParaRPr>
+          </a:p>
+        </p:txBody>
+      </p:sp>
+      <p:sp>
+        <p:nvSpPr>
+          <p:cNvPr id="6" name="Folded Corner 20">
+            <a:extLst>
+              <a:ext uri="{FF2B5EF4-FFF2-40B4-BE49-F238E27FC236}">
+                <a16:creationId xmlns:a16="http://schemas.microsoft.com/office/drawing/2014/main" id="{B4D321B2-0C4E-E82B-0339-77D58741A7C4}"/>
+              </a:ext>
+            </a:extLst>
+          </p:cNvPr>
+          <p:cNvSpPr/>
+          <p:nvPr/>
+        </p:nvSpPr>
+        <p:spPr>
+          <a:xfrm rot="16200000">
+            <a:off x="3388635" y="4235048"/>
+            <a:ext cx="668060" cy="1364457"/>
+          </a:xfrm>
+          <a:prstGeom prst="foldedCorner">
+            <a:avLst>
+              <a:gd name="adj" fmla="val 40193"/>
+            </a:avLst>
+          </a:prstGeom>
+          <a:noFill/>
+          <a:ln w="19050">
+            <a:solidFill>
+              <a:schemeClr val="tx1"/>
+            </a:solidFill>
+          </a:ln>
+        </p:spPr>
+        <p:style>
+          <a:lnRef idx="2">
+            <a:schemeClr val="accent1">
+              <a:shade val="50000"/>
+            </a:schemeClr>
+          </a:lnRef>
+          <a:fillRef idx="1">
+            <a:schemeClr val="accent1"/>
+          </a:fillRef>
+          <a:effectRef idx="0">
+            <a:schemeClr val="accent1"/>
+          </a:effectRef>
+          <a:fontRef idx="minor">
+            <a:schemeClr val="lt1"/>
+          </a:fontRef>
+        </p:style>
+        <p:txBody>
+          <a:bodyPr rot="0" spcFirstLastPara="0" vertOverflow="overflow" horzOverflow="overflow" vert="horz" wrap="square" lIns="68580" tIns="34291" rIns="68580" bIns="34291" numCol="1" spcCol="0" rtlCol="0" fromWordArt="0" anchor="ctr" anchorCtr="0" forceAA="0" compatLnSpc="1">
+            <a:prstTxWarp prst="textNoShape">
+              <a:avLst/>
+            </a:prstTxWarp>
+            <a:noAutofit/>
+          </a:bodyPr>
+          <a:lstStyle/>
+          <a:p>
+            <a:pPr algn="ctr"/>
+            <a:endParaRPr lang="en-GB" sz="1012">
+              <a:solidFill>
+                <a:schemeClr val="tx1"/>
+              </a:solidFill>
+            </a:endParaRPr>
+          </a:p>
+        </p:txBody>
+      </p:sp>
+      <p:sp>
+        <p:nvSpPr>
+          <p:cNvPr id="7" name="TextBox 6">
+            <a:extLst>
+              <a:ext uri="{FF2B5EF4-FFF2-40B4-BE49-F238E27FC236}">
+                <a16:creationId xmlns:a16="http://schemas.microsoft.com/office/drawing/2014/main" id="{FAC8A6F8-BA1C-5285-8302-A2542111D066}"/>
+              </a:ext>
+            </a:extLst>
+          </p:cNvPr>
+          <p:cNvSpPr txBox="1"/>
+          <p:nvPr/>
+        </p:nvSpPr>
+        <p:spPr>
+          <a:xfrm>
+            <a:off x="3036997" y="4680673"/>
+            <a:ext cx="1364456" cy="492058"/>
+          </a:xfrm>
+          <a:prstGeom prst="rect">
+            <a:avLst/>
+          </a:prstGeom>
+          <a:noFill/>
+        </p:spPr>
+        <p:txBody>
+          <a:bodyPr wrap="square" rtlCol="0">
+            <a:spAutoFit/>
+          </a:bodyPr>
+          <a:lstStyle/>
+          <a:p>
+            <a:pPr algn="ctr">
+              <a:lnSpc>
+                <a:spcPts val="1575"/>
+              </a:lnSpc>
+            </a:pPr>
+            <a:r>
+              <a:rPr lang="en-GB" sz="1200" dirty="0"/>
+              <a:t>[H] EB Safety Requirements</a:t>
+            </a:r>
+          </a:p>
+        </p:txBody>
+      </p:sp>
+      <p:sp>
+        <p:nvSpPr>
+          <p:cNvPr id="8" name="TextBox 7">
+            <a:extLst>
+              <a:ext uri="{FF2B5EF4-FFF2-40B4-BE49-F238E27FC236}">
+                <a16:creationId xmlns:a16="http://schemas.microsoft.com/office/drawing/2014/main" id="{79B43754-BC8C-742F-58B2-4E57B1E4F7C7}"/>
+              </a:ext>
+            </a:extLst>
+          </p:cNvPr>
+          <p:cNvSpPr txBox="1"/>
+          <p:nvPr/>
+        </p:nvSpPr>
+        <p:spPr>
+          <a:xfrm>
+            <a:off x="3012740" y="3388781"/>
+            <a:ext cx="1364456" cy="556178"/>
+          </a:xfrm>
+          <a:prstGeom prst="rect">
+            <a:avLst/>
+          </a:prstGeom>
+          <a:noFill/>
+        </p:spPr>
+        <p:txBody>
+          <a:bodyPr wrap="square" rtlCol="0">
+            <a:spAutoFit/>
+          </a:bodyPr>
+          <a:lstStyle/>
+          <a:p>
+            <a:pPr algn="ctr">
+              <a:lnSpc>
+                <a:spcPts val="1200"/>
+              </a:lnSpc>
+            </a:pPr>
+            <a:r>
+              <a:rPr lang="en-GB" sz="1200" b="1"/>
+              <a:t>3. Develop EB Safety Requirements</a:t>
+            </a:r>
+          </a:p>
+        </p:txBody>
+      </p:sp>
+      <p:sp>
+        <p:nvSpPr>
+          <p:cNvPr id="9" name="TextBox 8">
+            <a:extLst>
+              <a:ext uri="{FF2B5EF4-FFF2-40B4-BE49-F238E27FC236}">
+                <a16:creationId xmlns:a16="http://schemas.microsoft.com/office/drawing/2014/main" id="{AA8C5792-F5ED-0ED0-296F-5DCA53ED34B7}"/>
+              </a:ext>
+            </a:extLst>
+          </p:cNvPr>
+          <p:cNvSpPr txBox="1"/>
+          <p:nvPr/>
+        </p:nvSpPr>
+        <p:spPr>
+          <a:xfrm>
+            <a:off x="5200495" y="3381453"/>
+            <a:ext cx="1457325" cy="586956"/>
+          </a:xfrm>
+          <a:prstGeom prst="rect">
+            <a:avLst/>
+          </a:prstGeom>
+          <a:noFill/>
+        </p:spPr>
+        <p:txBody>
+          <a:bodyPr wrap="square" lIns="121920" tIns="60960" rIns="121920" bIns="60960" rtlCol="0" anchor="t">
+            <a:spAutoFit/>
+          </a:bodyPr>
+          <a:lstStyle/>
+          <a:p>
+            <a:pPr algn="ctr">
+              <a:lnSpc>
+                <a:spcPts val="1200"/>
+              </a:lnSpc>
+            </a:pPr>
+            <a:r>
+              <a:rPr lang="en-GB" sz="1200" b="1"/>
+              <a:t>4. Validate EB Safety Requirements</a:t>
+            </a:r>
+            <a:endParaRPr lang="en-GB" sz="1200" b="1">
+              <a:cs typeface="Arial"/>
+            </a:endParaRPr>
+          </a:p>
+        </p:txBody>
+      </p:sp>
+      <p:cxnSp>
+        <p:nvCxnSpPr>
+          <p:cNvPr id="10" name="Straight Connector 9">
+            <a:extLst>
+              <a:ext uri="{FF2B5EF4-FFF2-40B4-BE49-F238E27FC236}">
+                <a16:creationId xmlns:a16="http://schemas.microsoft.com/office/drawing/2014/main" id="{111CB13A-08B3-B305-F38E-5D3EFD145781}"/>
+              </a:ext>
+            </a:extLst>
+          </p:cNvPr>
+          <p:cNvCxnSpPr>
+            <a:cxnSpLocks/>
+          </p:cNvCxnSpPr>
+          <p:nvPr/>
+        </p:nvCxnSpPr>
+        <p:spPr>
+          <a:xfrm flipV="1">
+            <a:off x="4470064" y="3658264"/>
+            <a:ext cx="666139" cy="4904"/>
+          </a:xfrm>
+          <a:prstGeom prst="line">
+            <a:avLst/>
+          </a:prstGeom>
+          <a:ln w="19050">
+            <a:solidFill>
+              <a:schemeClr val="tx1"/>
+            </a:solidFill>
+            <a:prstDash val="solid"/>
+            <a:headEnd w="lg" len="lg"/>
+            <a:tailEnd type="triangle" w="lg" len="lg"/>
+          </a:ln>
+        </p:spPr>
+        <p:style>
+          <a:lnRef idx="1">
+            <a:schemeClr val="accent1"/>
+          </a:lnRef>
+          <a:fillRef idx="0">
+            <a:schemeClr val="accent1"/>
+          </a:fillRef>
+          <a:effectRef idx="0">
+            <a:schemeClr val="accent1"/>
+          </a:effectRef>
+          <a:fontRef idx="minor">
+            <a:schemeClr val="tx1"/>
+          </a:fontRef>
+        </p:style>
+      </p:cxnSp>
+      <p:sp>
+        <p:nvSpPr>
+          <p:cNvPr id="11" name="Folded Corner 30">
+            <a:extLst>
+              <a:ext uri="{FF2B5EF4-FFF2-40B4-BE49-F238E27FC236}">
+                <a16:creationId xmlns:a16="http://schemas.microsoft.com/office/drawing/2014/main" id="{BA9837FE-5F80-FDA0-87DB-7BF1739B8994}"/>
+              </a:ext>
+            </a:extLst>
+          </p:cNvPr>
+          <p:cNvSpPr/>
+          <p:nvPr/>
+        </p:nvSpPr>
+        <p:spPr>
+          <a:xfrm rot="16200000">
+            <a:off x="3363976" y="1824592"/>
+            <a:ext cx="668060" cy="1364457"/>
+          </a:xfrm>
+          <a:prstGeom prst="foldedCorner">
+            <a:avLst>
+              <a:gd name="adj" fmla="val 40193"/>
+            </a:avLst>
+          </a:prstGeom>
+          <a:noFill/>
+          <a:ln w="19050">
+            <a:solidFill>
+              <a:schemeClr val="tx1"/>
+            </a:solidFill>
+          </a:ln>
+        </p:spPr>
+        <p:style>
+          <a:lnRef idx="2">
+            <a:schemeClr val="accent1">
+              <a:shade val="50000"/>
+            </a:schemeClr>
+          </a:lnRef>
+          <a:fillRef idx="1">
+            <a:schemeClr val="accent1"/>
+          </a:fillRef>
+          <a:effectRef idx="0">
+            <a:schemeClr val="accent1"/>
+          </a:effectRef>
+          <a:fontRef idx="minor">
+            <a:schemeClr val="lt1"/>
+          </a:fontRef>
+        </p:style>
+        <p:txBody>
+          <a:bodyPr rot="0" spcFirstLastPara="0" vertOverflow="overflow" horzOverflow="overflow" vert="horz" wrap="square" lIns="68580" tIns="34291" rIns="68580" bIns="34291" numCol="1" spcCol="0" rtlCol="0" fromWordArt="0" anchor="ctr" anchorCtr="0" forceAA="0" compatLnSpc="1">
+            <a:prstTxWarp prst="textNoShape">
+              <a:avLst/>
+            </a:prstTxWarp>
+            <a:noAutofit/>
+          </a:bodyPr>
+          <a:lstStyle/>
+          <a:p>
+            <a:pPr algn="ctr"/>
+            <a:endParaRPr lang="en-GB" sz="1012">
+              <a:solidFill>
+                <a:schemeClr val="tx1"/>
+              </a:solidFill>
+            </a:endParaRPr>
+          </a:p>
+        </p:txBody>
+      </p:sp>
+      <p:sp>
+        <p:nvSpPr>
+          <p:cNvPr id="12" name="TextBox 11">
+            <a:extLst>
+              <a:ext uri="{FF2B5EF4-FFF2-40B4-BE49-F238E27FC236}">
+                <a16:creationId xmlns:a16="http://schemas.microsoft.com/office/drawing/2014/main" id="{D9791BC3-7D02-6B91-7965-017CB0E18324}"/>
+              </a:ext>
+            </a:extLst>
+          </p:cNvPr>
+          <p:cNvSpPr txBox="1"/>
+          <p:nvPr/>
+        </p:nvSpPr>
+        <p:spPr>
+          <a:xfrm>
+            <a:off x="2981994" y="2264445"/>
+            <a:ext cx="1364456" cy="556178"/>
+          </a:xfrm>
+          <a:prstGeom prst="rect">
+            <a:avLst/>
+          </a:prstGeom>
+          <a:noFill/>
+        </p:spPr>
+        <p:txBody>
+          <a:bodyPr wrap="square" rtlCol="0">
+            <a:spAutoFit/>
+          </a:bodyPr>
+          <a:lstStyle/>
+          <a:p>
+            <a:pPr algn="ctr">
+              <a:lnSpc>
+                <a:spcPts val="1200"/>
+              </a:lnSpc>
+            </a:pPr>
+            <a:r>
+              <a:rPr lang="en-GB" sz="1200" dirty="0"/>
+              <a:t>[E] Safety </a:t>
+            </a:r>
+            <a:r>
+              <a:rPr lang="en-GB" sz="1200" dirty="0" err="1"/>
+              <a:t>Rqts</a:t>
+            </a:r>
+            <a:r>
+              <a:rPr lang="en-GB" sz="1200" dirty="0"/>
+              <a:t> Allocated to Swarm</a:t>
+            </a:r>
+          </a:p>
+        </p:txBody>
+      </p:sp>
+      <p:sp>
+        <p:nvSpPr>
+          <p:cNvPr id="13" name="Folded Corner 32">
+            <a:extLst>
+              <a:ext uri="{FF2B5EF4-FFF2-40B4-BE49-F238E27FC236}">
+                <a16:creationId xmlns:a16="http://schemas.microsoft.com/office/drawing/2014/main" id="{1B86AE0D-1409-D7EC-4320-701C9550979F}"/>
+              </a:ext>
+            </a:extLst>
+          </p:cNvPr>
+          <p:cNvSpPr/>
+          <p:nvPr/>
+        </p:nvSpPr>
+        <p:spPr>
+          <a:xfrm rot="16200000">
+            <a:off x="7736051" y="1821030"/>
+            <a:ext cx="668060" cy="1364457"/>
+          </a:xfrm>
+          <a:prstGeom prst="foldedCorner">
+            <a:avLst>
+              <a:gd name="adj" fmla="val 40193"/>
+            </a:avLst>
+          </a:prstGeom>
+          <a:noFill/>
+          <a:ln w="19050">
+            <a:solidFill>
+              <a:schemeClr val="tx1"/>
+            </a:solidFill>
+          </a:ln>
+        </p:spPr>
+        <p:style>
+          <a:lnRef idx="2">
+            <a:schemeClr val="accent1">
+              <a:shade val="50000"/>
+            </a:schemeClr>
+          </a:lnRef>
+          <a:fillRef idx="1">
+            <a:schemeClr val="accent1"/>
+          </a:fillRef>
+          <a:effectRef idx="0">
+            <a:schemeClr val="accent1"/>
+          </a:effectRef>
+          <a:fontRef idx="minor">
+            <a:schemeClr val="lt1"/>
+          </a:fontRef>
+        </p:style>
+        <p:txBody>
+          <a:bodyPr rot="0" spcFirstLastPara="0" vertOverflow="overflow" horzOverflow="overflow" vert="horz" wrap="square" lIns="68580" tIns="34291" rIns="68580" bIns="34291" numCol="1" spcCol="0" rtlCol="0" fromWordArt="0" anchor="ctr" anchorCtr="0" forceAA="0" compatLnSpc="1">
+            <a:prstTxWarp prst="textNoShape">
+              <a:avLst/>
+            </a:prstTxWarp>
+            <a:noAutofit/>
+          </a:bodyPr>
+          <a:lstStyle/>
+          <a:p>
+            <a:pPr algn="ctr"/>
+            <a:endParaRPr lang="en-GB" sz="1012">
+              <a:solidFill>
+                <a:schemeClr val="tx1"/>
+              </a:solidFill>
+            </a:endParaRPr>
+          </a:p>
+        </p:txBody>
+      </p:sp>
+      <p:sp>
+        <p:nvSpPr>
+          <p:cNvPr id="14" name="TextBox 13">
+            <a:extLst>
+              <a:ext uri="{FF2B5EF4-FFF2-40B4-BE49-F238E27FC236}">
+                <a16:creationId xmlns:a16="http://schemas.microsoft.com/office/drawing/2014/main" id="{9836009F-4022-657D-0A9F-D15C715A8B03}"/>
+              </a:ext>
+            </a:extLst>
+          </p:cNvPr>
+          <p:cNvSpPr txBox="1"/>
+          <p:nvPr/>
+        </p:nvSpPr>
+        <p:spPr>
+          <a:xfrm>
+            <a:off x="7349172" y="2333684"/>
+            <a:ext cx="1364456" cy="402290"/>
+          </a:xfrm>
+          <a:prstGeom prst="rect">
+            <a:avLst/>
+          </a:prstGeom>
+          <a:noFill/>
+        </p:spPr>
+        <p:txBody>
+          <a:bodyPr wrap="square" rtlCol="0">
+            <a:spAutoFit/>
+          </a:bodyPr>
+          <a:lstStyle/>
+          <a:p>
+            <a:pPr algn="ctr">
+              <a:lnSpc>
+                <a:spcPts val="1200"/>
+              </a:lnSpc>
+            </a:pPr>
+            <a:r>
+              <a:rPr lang="en-GB" sz="1200" dirty="0"/>
+              <a:t>[I] EB Safety </a:t>
+            </a:r>
+            <a:r>
+              <a:rPr lang="en-GB" sz="1200" dirty="0" err="1"/>
+              <a:t>Rqts</a:t>
+            </a:r>
+            <a:r>
+              <a:rPr lang="en-GB" sz="1200" dirty="0"/>
+              <a:t> Argument Pattern</a:t>
+            </a:r>
+          </a:p>
+        </p:txBody>
+      </p:sp>
+      <p:sp>
+        <p:nvSpPr>
+          <p:cNvPr id="15" name="Rectangle 14">
+            <a:extLst>
+              <a:ext uri="{FF2B5EF4-FFF2-40B4-BE49-F238E27FC236}">
+                <a16:creationId xmlns:a16="http://schemas.microsoft.com/office/drawing/2014/main" id="{DBBB05D3-7254-41D8-7676-54C88E542E41}"/>
+              </a:ext>
+            </a:extLst>
+          </p:cNvPr>
+          <p:cNvSpPr/>
+          <p:nvPr/>
+        </p:nvSpPr>
+        <p:spPr>
+          <a:xfrm>
+            <a:off x="7363411" y="3298541"/>
+            <a:ext cx="1470820" cy="739775"/>
+          </a:xfrm>
+          <a:prstGeom prst="rect">
+            <a:avLst/>
+          </a:prstGeom>
+          <a:solidFill>
+            <a:schemeClr val="bg2">
+              <a:lumMod val="90000"/>
+            </a:schemeClr>
+          </a:solidFill>
+          <a:ln w="19050">
+            <a:solidFill>
+              <a:schemeClr val="tx1"/>
+            </a:solidFill>
+          </a:ln>
+        </p:spPr>
+        <p:style>
+          <a:lnRef idx="2">
+            <a:schemeClr val="accent1">
+              <a:shade val="50000"/>
+            </a:schemeClr>
+          </a:lnRef>
+          <a:fillRef idx="1">
+            <a:schemeClr val="accent1"/>
+          </a:fillRef>
+          <a:effectRef idx="0">
+            <a:schemeClr val="accent1"/>
+          </a:effectRef>
+          <a:fontRef idx="minor">
+            <a:schemeClr val="lt1"/>
+          </a:fontRef>
+        </p:style>
+        <p:txBody>
+          <a:bodyPr rot="0" spcFirstLastPara="0" vertOverflow="overflow" horzOverflow="overflow" vert="horz" wrap="square" lIns="68580" tIns="34291" rIns="68580" bIns="34291" numCol="1" spcCol="0" rtlCol="0" fromWordArt="0" anchor="ctr" anchorCtr="0" forceAA="0" compatLnSpc="1">
+            <a:prstTxWarp prst="textNoShape">
+              <a:avLst/>
+            </a:prstTxWarp>
+            <a:noAutofit/>
+          </a:bodyPr>
+          <a:lstStyle/>
+          <a:p>
+            <a:pPr algn="ctr"/>
+            <a:endParaRPr lang="en-GB" sz="1012">
+              <a:solidFill>
+                <a:schemeClr val="tx1"/>
+              </a:solidFill>
+            </a:endParaRPr>
+          </a:p>
+        </p:txBody>
+      </p:sp>
+      <p:sp>
+        <p:nvSpPr>
+          <p:cNvPr id="16" name="TextBox 15">
+            <a:extLst>
+              <a:ext uri="{FF2B5EF4-FFF2-40B4-BE49-F238E27FC236}">
+                <a16:creationId xmlns:a16="http://schemas.microsoft.com/office/drawing/2014/main" id="{0BDA5B49-350F-A345-FC78-6FB283F19CF6}"/>
+              </a:ext>
+            </a:extLst>
+          </p:cNvPr>
+          <p:cNvSpPr txBox="1"/>
+          <p:nvPr/>
+        </p:nvSpPr>
+        <p:spPr>
+          <a:xfrm>
+            <a:off x="7323174" y="3349728"/>
+            <a:ext cx="1602112" cy="586956"/>
+          </a:xfrm>
+          <a:prstGeom prst="rect">
+            <a:avLst/>
+          </a:prstGeom>
+          <a:noFill/>
+        </p:spPr>
+        <p:txBody>
+          <a:bodyPr wrap="square" lIns="121920" tIns="60960" rIns="121920" bIns="60960" rtlCol="0" anchor="t">
+            <a:spAutoFit/>
+          </a:bodyPr>
+          <a:lstStyle/>
+          <a:p>
+            <a:pPr algn="ctr">
+              <a:lnSpc>
+                <a:spcPts val="1200"/>
+              </a:lnSpc>
+            </a:pPr>
+            <a:r>
+              <a:rPr lang="en-GB" sz="1200" b="1"/>
+              <a:t>5. Instantiate EB Safety Requirements Argument Pattern</a:t>
+            </a:r>
+            <a:endParaRPr lang="en-GB" sz="1200" b="1">
+              <a:cs typeface="Arial"/>
+            </a:endParaRPr>
+          </a:p>
+        </p:txBody>
+      </p:sp>
+      <p:cxnSp>
+        <p:nvCxnSpPr>
+          <p:cNvPr id="17" name="Straight Connector 16">
+            <a:extLst>
+              <a:ext uri="{FF2B5EF4-FFF2-40B4-BE49-F238E27FC236}">
+                <a16:creationId xmlns:a16="http://schemas.microsoft.com/office/drawing/2014/main" id="{034DA708-740F-F6CD-F47B-B00898ECC17E}"/>
+              </a:ext>
+            </a:extLst>
+          </p:cNvPr>
+          <p:cNvCxnSpPr>
+            <a:cxnSpLocks/>
+          </p:cNvCxnSpPr>
+          <p:nvPr/>
+        </p:nvCxnSpPr>
+        <p:spPr>
+          <a:xfrm flipV="1">
+            <a:off x="6698778" y="3650517"/>
+            <a:ext cx="666139" cy="4904"/>
+          </a:xfrm>
+          <a:prstGeom prst="line">
+            <a:avLst/>
+          </a:prstGeom>
+          <a:ln w="19050">
+            <a:solidFill>
+              <a:schemeClr val="tx1"/>
+            </a:solidFill>
+            <a:prstDash val="solid"/>
+            <a:headEnd w="lg" len="lg"/>
+            <a:tailEnd type="triangle" w="lg" len="lg"/>
+          </a:ln>
+        </p:spPr>
+        <p:style>
+          <a:lnRef idx="1">
+            <a:schemeClr val="accent1"/>
+          </a:lnRef>
+          <a:fillRef idx="0">
+            <a:schemeClr val="accent1"/>
+          </a:fillRef>
+          <a:effectRef idx="0">
+            <a:schemeClr val="accent1"/>
+          </a:effectRef>
+          <a:fontRef idx="minor">
+            <a:schemeClr val="tx1"/>
+          </a:fontRef>
+        </p:style>
+      </p:cxnSp>
+      <p:cxnSp>
+        <p:nvCxnSpPr>
+          <p:cNvPr id="18" name="Straight Connector 17">
+            <a:extLst>
+              <a:ext uri="{FF2B5EF4-FFF2-40B4-BE49-F238E27FC236}">
+                <a16:creationId xmlns:a16="http://schemas.microsoft.com/office/drawing/2014/main" id="{F6190516-21F2-17F9-78DF-8862EE08E305}"/>
+              </a:ext>
+            </a:extLst>
+          </p:cNvPr>
+          <p:cNvCxnSpPr>
+            <a:cxnSpLocks/>
+          </p:cNvCxnSpPr>
+          <p:nvPr/>
+        </p:nvCxnSpPr>
+        <p:spPr>
+          <a:xfrm>
+            <a:off x="3690857" y="2831424"/>
+            <a:ext cx="4112" cy="467437"/>
+          </a:xfrm>
+          <a:prstGeom prst="line">
+            <a:avLst/>
+          </a:prstGeom>
+          <a:ln w="19050">
+            <a:solidFill>
+              <a:schemeClr val="tx1"/>
+            </a:solidFill>
+            <a:prstDash val="sysDash"/>
+            <a:headEnd w="lg" len="lg"/>
+            <a:tailEnd type="triangle" w="lg" len="lg"/>
+          </a:ln>
+        </p:spPr>
+        <p:style>
+          <a:lnRef idx="1">
+            <a:schemeClr val="accent1"/>
+          </a:lnRef>
+          <a:fillRef idx="0">
+            <a:schemeClr val="accent1"/>
+          </a:fillRef>
+          <a:effectRef idx="0">
+            <a:schemeClr val="accent1"/>
+          </a:effectRef>
+          <a:fontRef idx="minor">
+            <a:schemeClr val="tx1"/>
+          </a:fontRef>
+        </p:style>
+      </p:cxnSp>
+      <p:cxnSp>
+        <p:nvCxnSpPr>
+          <p:cNvPr id="19" name="Straight Connector 18">
+            <a:extLst>
+              <a:ext uri="{FF2B5EF4-FFF2-40B4-BE49-F238E27FC236}">
+                <a16:creationId xmlns:a16="http://schemas.microsoft.com/office/drawing/2014/main" id="{CB99BA82-B8B6-A7DE-3AE3-D456F1F5EC9F}"/>
+              </a:ext>
+            </a:extLst>
+          </p:cNvPr>
+          <p:cNvCxnSpPr>
+            <a:cxnSpLocks/>
+          </p:cNvCxnSpPr>
+          <p:nvPr/>
+        </p:nvCxnSpPr>
+        <p:spPr>
+          <a:xfrm>
+            <a:off x="3710334" y="4026176"/>
+            <a:ext cx="4112" cy="560888"/>
+          </a:xfrm>
+          <a:prstGeom prst="line">
+            <a:avLst/>
+          </a:prstGeom>
+          <a:ln w="19050">
+            <a:solidFill>
+              <a:schemeClr val="tx1"/>
+            </a:solidFill>
+            <a:prstDash val="sysDash"/>
+            <a:headEnd w="lg" len="lg"/>
+            <a:tailEnd type="triangle" w="lg" len="lg"/>
+          </a:ln>
+        </p:spPr>
+        <p:style>
+          <a:lnRef idx="1">
+            <a:schemeClr val="accent1"/>
+          </a:lnRef>
+          <a:fillRef idx="0">
+            <a:schemeClr val="accent1"/>
+          </a:fillRef>
+          <a:effectRef idx="0">
+            <a:schemeClr val="accent1"/>
+          </a:effectRef>
+          <a:fontRef idx="minor">
+            <a:schemeClr val="tx1"/>
+          </a:fontRef>
+        </p:style>
+      </p:cxnSp>
+      <p:cxnSp>
+        <p:nvCxnSpPr>
+          <p:cNvPr id="20" name="Straight Connector 19">
+            <a:extLst>
+              <a:ext uri="{FF2B5EF4-FFF2-40B4-BE49-F238E27FC236}">
+                <a16:creationId xmlns:a16="http://schemas.microsoft.com/office/drawing/2014/main" id="{D20A393D-DDD6-2FB2-A19D-D594BB4B3568}"/>
+              </a:ext>
+            </a:extLst>
+          </p:cNvPr>
+          <p:cNvCxnSpPr>
+            <a:cxnSpLocks/>
+            <a:stCxn id="13" idx="1"/>
+          </p:cNvCxnSpPr>
+          <p:nvPr/>
+        </p:nvCxnSpPr>
+        <p:spPr>
+          <a:xfrm>
+            <a:off x="8070082" y="2837289"/>
+            <a:ext cx="2054" cy="466238"/>
+          </a:xfrm>
+          <a:prstGeom prst="line">
+            <a:avLst/>
+          </a:prstGeom>
+          <a:ln w="19050">
+            <a:solidFill>
+              <a:schemeClr val="tx1"/>
+            </a:solidFill>
+            <a:prstDash val="sysDash"/>
+            <a:headEnd w="lg" len="lg"/>
+            <a:tailEnd type="triangle" w="lg" len="lg"/>
+          </a:ln>
+        </p:spPr>
+        <p:style>
+          <a:lnRef idx="1">
+            <a:schemeClr val="accent1"/>
+          </a:lnRef>
+          <a:fillRef idx="0">
+            <a:schemeClr val="accent1"/>
+          </a:fillRef>
+          <a:effectRef idx="0">
+            <a:schemeClr val="accent1"/>
+          </a:effectRef>
+          <a:fontRef idx="minor">
+            <a:schemeClr val="tx1"/>
+          </a:fontRef>
+        </p:style>
+      </p:cxnSp>
+      <p:sp>
+        <p:nvSpPr>
+          <p:cNvPr id="21" name="Folded Corner 46">
+            <a:extLst>
+              <a:ext uri="{FF2B5EF4-FFF2-40B4-BE49-F238E27FC236}">
+                <a16:creationId xmlns:a16="http://schemas.microsoft.com/office/drawing/2014/main" id="{597A1D2E-937A-4B12-2242-BAFFE33D04CB}"/>
+              </a:ext>
+            </a:extLst>
+          </p:cNvPr>
+          <p:cNvSpPr/>
+          <p:nvPr/>
+        </p:nvSpPr>
+        <p:spPr>
+          <a:xfrm rot="16200000">
+            <a:off x="5616976" y="4227805"/>
+            <a:ext cx="668060" cy="1364457"/>
+          </a:xfrm>
+          <a:prstGeom prst="foldedCorner">
+            <a:avLst>
+              <a:gd name="adj" fmla="val 40193"/>
+            </a:avLst>
+          </a:prstGeom>
+          <a:noFill/>
+          <a:ln w="19050">
+            <a:solidFill>
+              <a:schemeClr val="tx1"/>
+            </a:solidFill>
+          </a:ln>
+        </p:spPr>
+        <p:style>
+          <a:lnRef idx="2">
+            <a:schemeClr val="accent1">
+              <a:shade val="50000"/>
+            </a:schemeClr>
+          </a:lnRef>
+          <a:fillRef idx="1">
+            <a:schemeClr val="accent1"/>
+          </a:fillRef>
+          <a:effectRef idx="0">
+            <a:schemeClr val="accent1"/>
+          </a:effectRef>
+          <a:fontRef idx="minor">
+            <a:schemeClr val="lt1"/>
+          </a:fontRef>
+        </p:style>
+        <p:txBody>
+          <a:bodyPr rot="0" spcFirstLastPara="0" vertOverflow="overflow" horzOverflow="overflow" vert="horz" wrap="square" lIns="68580" tIns="34291" rIns="68580" bIns="34291" numCol="1" spcCol="0" rtlCol="0" fromWordArt="0" anchor="ctr" anchorCtr="0" forceAA="0" compatLnSpc="1">
+            <a:prstTxWarp prst="textNoShape">
+              <a:avLst/>
+            </a:prstTxWarp>
+            <a:noAutofit/>
+          </a:bodyPr>
+          <a:lstStyle/>
+          <a:p>
+            <a:pPr algn="ctr"/>
+            <a:endParaRPr lang="en-GB" sz="1012">
+              <a:solidFill>
+                <a:schemeClr val="tx1"/>
+              </a:solidFill>
+            </a:endParaRPr>
+          </a:p>
+        </p:txBody>
+      </p:sp>
+      <p:sp>
+        <p:nvSpPr>
+          <p:cNvPr id="22" name="TextBox 21">
+            <a:extLst>
+              <a:ext uri="{FF2B5EF4-FFF2-40B4-BE49-F238E27FC236}">
+                <a16:creationId xmlns:a16="http://schemas.microsoft.com/office/drawing/2014/main" id="{7DBFAF75-B148-16D3-A68C-A8066D432410}"/>
+              </a:ext>
+            </a:extLst>
+          </p:cNvPr>
+          <p:cNvSpPr txBox="1"/>
+          <p:nvPr/>
+        </p:nvSpPr>
+        <p:spPr>
+          <a:xfrm>
+            <a:off x="5265338" y="4673429"/>
+            <a:ext cx="1236190" cy="556178"/>
+          </a:xfrm>
+          <a:prstGeom prst="rect">
+            <a:avLst/>
+          </a:prstGeom>
+          <a:noFill/>
+        </p:spPr>
+        <p:txBody>
+          <a:bodyPr wrap="square" rtlCol="0">
+            <a:spAutoFit/>
+          </a:bodyPr>
+          <a:lstStyle/>
+          <a:p>
+            <a:pPr algn="ctr">
+              <a:lnSpc>
+                <a:spcPts val="1200"/>
+              </a:lnSpc>
+            </a:pPr>
+            <a:r>
+              <a:rPr lang="en-GB" sz="1200" dirty="0"/>
+              <a:t>[J] EB Safety </a:t>
+            </a:r>
+            <a:r>
+              <a:rPr lang="en-GB" sz="1200" dirty="0" err="1"/>
+              <a:t>Rqts</a:t>
+            </a:r>
+            <a:r>
+              <a:rPr lang="en-GB" sz="1200" dirty="0"/>
+              <a:t> Validation Results</a:t>
+            </a:r>
+          </a:p>
+        </p:txBody>
+      </p:sp>
+      <p:cxnSp>
+        <p:nvCxnSpPr>
+          <p:cNvPr id="23" name="Straight Connector 22">
+            <a:extLst>
+              <a:ext uri="{FF2B5EF4-FFF2-40B4-BE49-F238E27FC236}">
+                <a16:creationId xmlns:a16="http://schemas.microsoft.com/office/drawing/2014/main" id="{4F6875F1-B49D-05F3-86DB-40B857959435}"/>
+              </a:ext>
+            </a:extLst>
+          </p:cNvPr>
+          <p:cNvCxnSpPr>
+            <a:cxnSpLocks/>
+          </p:cNvCxnSpPr>
+          <p:nvPr/>
+        </p:nvCxnSpPr>
+        <p:spPr>
+          <a:xfrm>
+            <a:off x="5877032" y="4019781"/>
+            <a:ext cx="4112" cy="560888"/>
+          </a:xfrm>
+          <a:prstGeom prst="line">
+            <a:avLst/>
+          </a:prstGeom>
+          <a:ln w="19050">
+            <a:solidFill>
+              <a:schemeClr val="tx1"/>
+            </a:solidFill>
+            <a:prstDash val="sysDash"/>
+            <a:headEnd w="lg" len="lg"/>
+            <a:tailEnd type="triangle" w="lg" len="lg"/>
+          </a:ln>
+        </p:spPr>
+        <p:style>
+          <a:lnRef idx="1">
+            <a:schemeClr val="accent1"/>
+          </a:lnRef>
+          <a:fillRef idx="0">
+            <a:schemeClr val="accent1"/>
+          </a:fillRef>
+          <a:effectRef idx="0">
+            <a:schemeClr val="accent1"/>
+          </a:effectRef>
+          <a:fontRef idx="minor">
+            <a:schemeClr val="tx1"/>
+          </a:fontRef>
+        </p:style>
+      </p:cxnSp>
+      <p:sp>
+        <p:nvSpPr>
+          <p:cNvPr id="24" name="Folded Corner 49">
+            <a:extLst>
+              <a:ext uri="{FF2B5EF4-FFF2-40B4-BE49-F238E27FC236}">
+                <a16:creationId xmlns:a16="http://schemas.microsoft.com/office/drawing/2014/main" id="{D44A9FEE-4907-9B59-93AD-3FFB99629F4D}"/>
+              </a:ext>
+            </a:extLst>
+          </p:cNvPr>
+          <p:cNvSpPr/>
+          <p:nvPr/>
+        </p:nvSpPr>
+        <p:spPr>
+          <a:xfrm rot="16200000">
+            <a:off x="7755363" y="4243681"/>
+            <a:ext cx="668060" cy="1364457"/>
+          </a:xfrm>
+          <a:prstGeom prst="foldedCorner">
+            <a:avLst>
+              <a:gd name="adj" fmla="val 40193"/>
+            </a:avLst>
+          </a:prstGeom>
+          <a:noFill/>
+          <a:ln w="19050">
+            <a:solidFill>
+              <a:schemeClr val="tx1"/>
+            </a:solidFill>
+          </a:ln>
+        </p:spPr>
+        <p:style>
+          <a:lnRef idx="2">
+            <a:schemeClr val="accent1">
+              <a:shade val="50000"/>
+            </a:schemeClr>
+          </a:lnRef>
+          <a:fillRef idx="1">
+            <a:schemeClr val="accent1"/>
+          </a:fillRef>
+          <a:effectRef idx="0">
+            <a:schemeClr val="accent1"/>
+          </a:effectRef>
+          <a:fontRef idx="minor">
+            <a:schemeClr val="lt1"/>
+          </a:fontRef>
+        </p:style>
+        <p:txBody>
+          <a:bodyPr rot="0" spcFirstLastPara="0" vertOverflow="overflow" horzOverflow="overflow" vert="horz" wrap="square" lIns="68580" tIns="34291" rIns="68580" bIns="34291" numCol="1" spcCol="0" rtlCol="0" fromWordArt="0" anchor="ctr" anchorCtr="0" forceAA="0" compatLnSpc="1">
+            <a:prstTxWarp prst="textNoShape">
+              <a:avLst/>
+            </a:prstTxWarp>
+            <a:noAutofit/>
+          </a:bodyPr>
+          <a:lstStyle/>
+          <a:p>
+            <a:pPr algn="ctr"/>
+            <a:endParaRPr lang="en-GB" sz="1012">
+              <a:solidFill>
+                <a:schemeClr val="tx1"/>
+              </a:solidFill>
+            </a:endParaRPr>
+          </a:p>
+        </p:txBody>
+      </p:sp>
+      <p:sp>
+        <p:nvSpPr>
+          <p:cNvPr id="25" name="TextBox 24">
+            <a:extLst>
+              <a:ext uri="{FF2B5EF4-FFF2-40B4-BE49-F238E27FC236}">
+                <a16:creationId xmlns:a16="http://schemas.microsoft.com/office/drawing/2014/main" id="{79C8DFCA-D989-6492-C5B2-DC625F751C0B}"/>
+              </a:ext>
+            </a:extLst>
+          </p:cNvPr>
+          <p:cNvSpPr txBox="1"/>
+          <p:nvPr/>
+        </p:nvSpPr>
+        <p:spPr>
+          <a:xfrm>
+            <a:off x="7403725" y="4689305"/>
+            <a:ext cx="1364456" cy="522835"/>
+          </a:xfrm>
+          <a:prstGeom prst="rect">
+            <a:avLst/>
+          </a:prstGeom>
+          <a:noFill/>
+        </p:spPr>
+        <p:txBody>
+          <a:bodyPr wrap="square" lIns="121920" tIns="60960" rIns="121920" bIns="60960" rtlCol="0" anchor="t">
+            <a:spAutoFit/>
+          </a:bodyPr>
+          <a:lstStyle/>
+          <a:p>
+            <a:pPr algn="ctr">
+              <a:lnSpc>
+                <a:spcPts val="1575"/>
+              </a:lnSpc>
+            </a:pPr>
+            <a:r>
+              <a:rPr lang="en-GB" sz="1200" dirty="0"/>
+              <a:t>[K] EB Safety </a:t>
+            </a:r>
+            <a:r>
+              <a:rPr lang="en-GB" sz="1200" dirty="0" err="1"/>
+              <a:t>Rqts</a:t>
+            </a:r>
+            <a:r>
+              <a:rPr lang="en-GB" sz="1200" dirty="0"/>
+              <a:t> Argument</a:t>
+            </a:r>
+          </a:p>
+        </p:txBody>
+      </p:sp>
+      <p:cxnSp>
+        <p:nvCxnSpPr>
+          <p:cNvPr id="26" name="Straight Connector 25">
+            <a:extLst>
+              <a:ext uri="{FF2B5EF4-FFF2-40B4-BE49-F238E27FC236}">
+                <a16:creationId xmlns:a16="http://schemas.microsoft.com/office/drawing/2014/main" id="{AF8133BF-6B63-24CB-82B0-8A28298AFFB5}"/>
+              </a:ext>
+            </a:extLst>
+          </p:cNvPr>
+          <p:cNvCxnSpPr>
+            <a:cxnSpLocks/>
+          </p:cNvCxnSpPr>
+          <p:nvPr/>
+        </p:nvCxnSpPr>
+        <p:spPr>
+          <a:xfrm>
+            <a:off x="8087337" y="4025381"/>
+            <a:ext cx="4112" cy="560888"/>
+          </a:xfrm>
+          <a:prstGeom prst="line">
+            <a:avLst/>
+          </a:prstGeom>
+          <a:ln w="19050">
+            <a:solidFill>
+              <a:schemeClr val="tx1"/>
+            </a:solidFill>
+            <a:prstDash val="sysDash"/>
+            <a:headEnd w="lg" len="lg"/>
+            <a:tailEnd type="triangle" w="lg" len="lg"/>
+          </a:ln>
+        </p:spPr>
+        <p:style>
+          <a:lnRef idx="1">
+            <a:schemeClr val="accent1"/>
+          </a:lnRef>
+          <a:fillRef idx="0">
+            <a:schemeClr val="accent1"/>
+          </a:fillRef>
+          <a:effectRef idx="0">
+            <a:schemeClr val="accent1"/>
+          </a:effectRef>
+          <a:fontRef idx="minor">
+            <a:schemeClr val="tx1"/>
+          </a:fontRef>
+        </p:style>
+      </p:cxnSp>
+      <p:cxnSp>
+        <p:nvCxnSpPr>
+          <p:cNvPr id="27" name="Straight Connector 26">
+            <a:extLst>
+              <a:ext uri="{FF2B5EF4-FFF2-40B4-BE49-F238E27FC236}">
+                <a16:creationId xmlns:a16="http://schemas.microsoft.com/office/drawing/2014/main" id="{95504D35-3A60-8029-88CD-3977670A6DB3}"/>
+              </a:ext>
+            </a:extLst>
+          </p:cNvPr>
+          <p:cNvCxnSpPr>
+            <a:cxnSpLocks/>
+          </p:cNvCxnSpPr>
+          <p:nvPr/>
+        </p:nvCxnSpPr>
+        <p:spPr>
+          <a:xfrm flipV="1">
+            <a:off x="4194928" y="4004564"/>
+            <a:ext cx="947724" cy="597533"/>
+          </a:xfrm>
+          <a:prstGeom prst="line">
+            <a:avLst/>
+          </a:prstGeom>
+          <a:ln w="19050">
+            <a:solidFill>
+              <a:schemeClr val="tx1"/>
+            </a:solidFill>
+            <a:prstDash val="sysDash"/>
+            <a:headEnd w="lg" len="lg"/>
+            <a:tailEnd type="triangle" w="lg" len="lg"/>
+          </a:ln>
+        </p:spPr>
+        <p:style>
+          <a:lnRef idx="1">
+            <a:schemeClr val="accent1"/>
+          </a:lnRef>
+          <a:fillRef idx="0">
+            <a:schemeClr val="accent1"/>
+          </a:fillRef>
+          <a:effectRef idx="0">
+            <a:schemeClr val="accent1"/>
+          </a:effectRef>
+          <a:fontRef idx="minor">
+            <a:schemeClr val="tx1"/>
+          </a:fontRef>
+        </p:style>
+      </p:cxnSp>
+    </p:spTree>
+    <p:extLst>
+      <p:ext uri="{BB962C8B-B14F-4D97-AF65-F5344CB8AC3E}">
+        <p14:creationId xmlns:p14="http://schemas.microsoft.com/office/powerpoint/2010/main" val="2595279134"/>
+      </p:ext>
+    </p:extLst>
+  </p:cSld>
+  <p:clrMapOvr>
+    <a:masterClrMapping/>
+  </p:clrMapOvr>
+</p:sld>
+</file>
+
 <file path=ppt/theme/theme1.xml><?xml version="1.0" encoding="utf-8"?>
 <a:theme xmlns:a="http://schemas.openxmlformats.org/drawingml/2006/main" name="Office Theme">
   <a:themeElements>

</xml_diff>